<commit_message>
User manual for release 0.3
</commit_message>
<xml_diff>
--- a/mansrc/polar_params.pptx
+++ b/mansrc/polar_params.pptx
@@ -104,6 +104,22 @@
       </a:defRPr>
     </a:lvl9pPr>
   </p:defaultTextStyle>
+  <p:extLst>
+    <p:ext uri="{EFAFB233-063F-42B5-8137-9DF3F51BA10A}">
+      <p15:sldGuideLst xmlns:p15="http://schemas.microsoft.com/office/powerpoint/2012/main">
+        <p15:guide id="1" orient="horz" pos="2880">
+          <p15:clr>
+            <a:srgbClr val="A4A3A4"/>
+          </p15:clr>
+        </p15:guide>
+        <p15:guide id="2" pos="2160">
+          <p15:clr>
+            <a:srgbClr val="A4A3A4"/>
+          </p15:clr>
+        </p15:guide>
+      </p15:sldGuideLst>
+    </p:ext>
+  </p:extLst>
 </p:presentation>
 </file>
 
@@ -288,7 +304,7 @@
           <a:p>
             <a:fld id="{DF756CAE-ACB3-443A-A8AF-C3638711B93B}" type="datetimeFigureOut">
               <a:rPr lang="es-ES" smtClean="0"/>
-              <a:t>19/05/2016</a:t>
+              <a:t>21/04/2017</a:t>
             </a:fld>
             <a:endParaRPr lang="es-ES"/>
           </a:p>
@@ -458,7 +474,7 @@
           <a:p>
             <a:fld id="{DF756CAE-ACB3-443A-A8AF-C3638711B93B}" type="datetimeFigureOut">
               <a:rPr lang="es-ES" smtClean="0"/>
-              <a:t>19/05/2016</a:t>
+              <a:t>21/04/2017</a:t>
             </a:fld>
             <a:endParaRPr lang="es-ES"/>
           </a:p>
@@ -638,7 +654,7 @@
           <a:p>
             <a:fld id="{DF756CAE-ACB3-443A-A8AF-C3638711B93B}" type="datetimeFigureOut">
               <a:rPr lang="es-ES" smtClean="0"/>
-              <a:t>19/05/2016</a:t>
+              <a:t>21/04/2017</a:t>
             </a:fld>
             <a:endParaRPr lang="es-ES"/>
           </a:p>
@@ -808,7 +824,7 @@
           <a:p>
             <a:fld id="{DF756CAE-ACB3-443A-A8AF-C3638711B93B}" type="datetimeFigureOut">
               <a:rPr lang="es-ES" smtClean="0"/>
-              <a:t>19/05/2016</a:t>
+              <a:t>21/04/2017</a:t>
             </a:fld>
             <a:endParaRPr lang="es-ES"/>
           </a:p>
@@ -1054,7 +1070,7 @@
           <a:p>
             <a:fld id="{DF756CAE-ACB3-443A-A8AF-C3638711B93B}" type="datetimeFigureOut">
               <a:rPr lang="es-ES" smtClean="0"/>
-              <a:t>19/05/2016</a:t>
+              <a:t>21/04/2017</a:t>
             </a:fld>
             <a:endParaRPr lang="es-ES"/>
           </a:p>
@@ -1342,7 +1358,7 @@
           <a:p>
             <a:fld id="{DF756CAE-ACB3-443A-A8AF-C3638711B93B}" type="datetimeFigureOut">
               <a:rPr lang="es-ES" smtClean="0"/>
-              <a:t>19/05/2016</a:t>
+              <a:t>21/04/2017</a:t>
             </a:fld>
             <a:endParaRPr lang="es-ES"/>
           </a:p>
@@ -1769,7 +1785,7 @@
           <a:p>
             <a:fld id="{DF756CAE-ACB3-443A-A8AF-C3638711B93B}" type="datetimeFigureOut">
               <a:rPr lang="es-ES" smtClean="0"/>
-              <a:t>19/05/2016</a:t>
+              <a:t>21/04/2017</a:t>
             </a:fld>
             <a:endParaRPr lang="es-ES"/>
           </a:p>
@@ -1887,7 +1903,7 @@
           <a:p>
             <a:fld id="{DF756CAE-ACB3-443A-A8AF-C3638711B93B}" type="datetimeFigureOut">
               <a:rPr lang="es-ES" smtClean="0"/>
-              <a:t>19/05/2016</a:t>
+              <a:t>21/04/2017</a:t>
             </a:fld>
             <a:endParaRPr lang="es-ES"/>
           </a:p>
@@ -1982,7 +1998,7 @@
           <a:p>
             <a:fld id="{DF756CAE-ACB3-443A-A8AF-C3638711B93B}" type="datetimeFigureOut">
               <a:rPr lang="es-ES" smtClean="0"/>
-              <a:t>19/05/2016</a:t>
+              <a:t>21/04/2017</a:t>
             </a:fld>
             <a:endParaRPr lang="es-ES"/>
           </a:p>
@@ -2259,7 +2275,7 @@
           <a:p>
             <a:fld id="{DF756CAE-ACB3-443A-A8AF-C3638711B93B}" type="datetimeFigureOut">
               <a:rPr lang="es-ES" smtClean="0"/>
-              <a:t>19/05/2016</a:t>
+              <a:t>21/04/2017</a:t>
             </a:fld>
             <a:endParaRPr lang="es-ES"/>
           </a:p>
@@ -2512,7 +2528,7 @@
           <a:p>
             <a:fld id="{DF756CAE-ACB3-443A-A8AF-C3638711B93B}" type="datetimeFigureOut">
               <a:rPr lang="es-ES" smtClean="0"/>
-              <a:t>19/05/2016</a:t>
+              <a:t>21/04/2017</a:t>
             </a:fld>
             <a:endParaRPr lang="es-ES"/>
           </a:p>
@@ -2725,7 +2741,7 @@
           <a:p>
             <a:fld id="{DF756CAE-ACB3-443A-A8AF-C3638711B93B}" type="datetimeFigureOut">
               <a:rPr lang="es-ES" smtClean="0"/>
-              <a:t>19/05/2016</a:t>
+              <a:t>21/04/2017</a:t>
             </a:fld>
             <a:endParaRPr lang="es-ES"/>
           </a:p>
@@ -3102,9 +3118,9 @@
       </p:grpSpPr>
       <p:pic>
         <p:nvPicPr>
-          <p:cNvPr id="1028" name="Picture 4" descr="D:\disco_usuario\javier\upm\doctorado\tesis\codigo\k-analysis\grafresults\M_SD_001_polar_showpars.png"/>
+          <p:cNvPr id="6" name="Imagen 5"/>
           <p:cNvPicPr>
-            <a:picLocks noChangeAspect="1" noChangeArrowheads="1"/>
+            <a:picLocks noChangeAspect="1"/>
           </p:cNvPicPr>
           <p:nvPr/>
         </p:nvPicPr>
@@ -3126,29 +3142,18 @@
               </a:ext>
             </a:extLst>
           </a:blip>
-          <a:srcRect/>
           <a:stretch>
             <a:fillRect/>
           </a:stretch>
         </p:blipFill>
-        <p:spPr bwMode="auto">
+        <p:spPr>
           <a:xfrm>
-            <a:off x="157675" y="323528"/>
-            <a:ext cx="6583693" cy="6583693"/>
+            <a:off x="160124" y="278693"/>
+            <a:ext cx="6858000" cy="6858000"/>
           </a:xfrm>
           <a:prstGeom prst="rect">
             <a:avLst/>
           </a:prstGeom>
-          <a:noFill/>
-          <a:extLst>
-            <a:ext uri="{909E8E84-426E-40DD-AFC4-6F175D3DCCD1}">
-              <a14:hiddenFill xmlns:a14="http://schemas.microsoft.com/office/drawing/2010/main">
-                <a:solidFill>
-                  <a:srgbClr val="FFFFFF"/>
-                </a:solidFill>
-              </a14:hiddenFill>
-            </a:ext>
-          </a:extLst>
         </p:spPr>
       </p:pic>
       <p:sp>
@@ -3159,7 +3164,7 @@
         </p:nvSpPr>
         <p:spPr>
           <a:xfrm>
-            <a:off x="137153" y="4932040"/>
+            <a:off x="160124" y="5247435"/>
             <a:ext cx="6583693" cy="2232248"/>
           </a:xfrm>
           <a:prstGeom prst="rect">
@@ -3206,7 +3211,7 @@
         </p:nvSpPr>
         <p:spPr>
           <a:xfrm>
-            <a:off x="230908" y="7362315"/>
+            <a:off x="-57124" y="4702693"/>
             <a:ext cx="1643655" cy="338554"/>
           </a:xfrm>
           <a:prstGeom prst="rect">
@@ -3244,9 +3249,9 @@
           <p:nvPr/>
         </p:nvCxnSpPr>
         <p:spPr>
-          <a:xfrm flipV="1">
-            <a:off x="1874563" y="7164288"/>
-            <a:ext cx="474317" cy="367304"/>
+          <a:xfrm>
+            <a:off x="1586531" y="4871970"/>
+            <a:ext cx="618333" cy="375465"/>
           </a:xfrm>
           <a:prstGeom prst="line">
             <a:avLst/>
@@ -3438,8 +3443,8 @@
         </p:nvCxnSpPr>
         <p:spPr>
           <a:xfrm flipV="1">
-            <a:off x="5661248" y="4211960"/>
-            <a:ext cx="188912" cy="313294"/>
+            <a:off x="5474266" y="3847826"/>
+            <a:ext cx="204370" cy="575772"/>
           </a:xfrm>
           <a:prstGeom prst="line">
             <a:avLst/>
@@ -3474,8 +3479,8 @@
         </p:nvSpPr>
         <p:spPr>
           <a:xfrm>
-            <a:off x="160124" y="1403648"/>
-            <a:ext cx="1482329" cy="1077218"/>
+            <a:off x="64554" y="1403648"/>
+            <a:ext cx="1673470" cy="830997"/>
           </a:xfrm>
           <a:prstGeom prst="rect">
             <a:avLst/>
@@ -3502,18 +3507,31 @@
                   <a:srgbClr val="FF0000"/>
                 </a:solidFill>
               </a:rPr>
-              <a:t> = 3</a:t>
-            </a:r>
-          </a:p>
-          <a:p>
-            <a:pPr algn="ctr"/>
+              <a:t> = </a:t>
+            </a:r>
             <a:r>
               <a:rPr lang="es-ES" sz="1600" i="1" dirty="0" smtClean="0">
                 <a:solidFill>
                   <a:srgbClr val="FF0000"/>
                 </a:solidFill>
               </a:rPr>
-              <a:t>(3 </a:t>
+              <a:t>100</a:t>
+            </a:r>
+            <a:endParaRPr lang="es-ES" sz="1600" i="1" dirty="0" smtClean="0">
+              <a:solidFill>
+                <a:srgbClr val="FF0000"/>
+              </a:solidFill>
+            </a:endParaRPr>
+          </a:p>
+          <a:p>
+            <a:pPr algn="ctr"/>
+            <a:r>
+              <a:rPr lang="es-ES" sz="1600" i="1" dirty="0" smtClean="0">
+                <a:solidFill>
+                  <a:srgbClr val="FF0000"/>
+                </a:solidFill>
+              </a:rPr>
+              <a:t>(</a:t>
             </a:r>
             <a:r>
               <a:rPr lang="es-ES" sz="1600" i="1" dirty="0" err="1" smtClean="0">
@@ -3521,7 +3539,7 @@
                   <a:srgbClr val="FF0000"/>
                 </a:solidFill>
               </a:rPr>
-              <a:t>most</a:t>
+              <a:t>print</a:t>
             </a:r>
             <a:r>
               <a:rPr lang="es-ES" sz="1600" i="1" dirty="0" smtClean="0">
@@ -3529,73 +3547,26 @@
                   <a:srgbClr val="FF0000"/>
                 </a:solidFill>
               </a:rPr>
-              <a:t> central </a:t>
+              <a:t> up to 100</a:t>
             </a:r>
           </a:p>
           <a:p>
             <a:pPr algn="ctr"/>
-            <a:r>
-              <a:rPr lang="es-ES" sz="1600" i="1" smtClean="0">
-                <a:solidFill>
-                  <a:srgbClr val="FF0000"/>
-                </a:solidFill>
-              </a:rPr>
-              <a:t>and </a:t>
-            </a:r>
-            <a:r>
-              <a:rPr lang="es-ES" sz="1600" i="1" dirty="0" smtClean="0">
-                <a:solidFill>
-                  <a:srgbClr val="FF0000"/>
-                </a:solidFill>
-              </a:rPr>
-              <a:t>3 </a:t>
-            </a:r>
             <a:r>
               <a:rPr lang="es-ES" sz="1600" i="1" dirty="0" err="1" smtClean="0">
                 <a:solidFill>
                   <a:srgbClr val="FF0000"/>
                 </a:solidFill>
               </a:rPr>
-              <a:t>most</a:t>
-            </a:r>
-            <a:r>
-              <a:rPr lang="es-ES" sz="1600" i="1" dirty="0" smtClean="0">
+              <a:t>label</a:t>
+            </a:r>
+            <a:r>
+              <a:rPr lang="es-ES" sz="1600" i="1" dirty="0" err="1">
                 <a:solidFill>
                   <a:srgbClr val="FF0000"/>
                 </a:solidFill>
               </a:rPr>
-              <a:t> </a:t>
-            </a:r>
-            <a:br>
-              <a:rPr lang="es-ES" sz="1600" i="1" dirty="0" smtClean="0">
-                <a:solidFill>
-                  <a:srgbClr val="FF0000"/>
-                </a:solidFill>
-              </a:rPr>
-            </a:br>
-            <a:r>
-              <a:rPr lang="es-ES" sz="1600" i="1" dirty="0" err="1" smtClean="0">
-                <a:solidFill>
-                  <a:srgbClr val="FF0000"/>
-                </a:solidFill>
-              </a:rPr>
-              <a:t>distant</a:t>
-            </a:r>
-            <a:r>
-              <a:rPr lang="es-ES" sz="1600" i="1" dirty="0" smtClean="0">
-                <a:solidFill>
-                  <a:srgbClr val="FF0000"/>
-                </a:solidFill>
-              </a:rPr>
-              <a:t> </a:t>
-            </a:r>
-            <a:r>
-              <a:rPr lang="es-ES" sz="1600" i="1" dirty="0" err="1" smtClean="0">
-                <a:solidFill>
-                  <a:srgbClr val="FF0000"/>
-                </a:solidFill>
-              </a:rPr>
-              <a:t>species</a:t>
+              <a:t>s</a:t>
             </a:r>
             <a:r>
               <a:rPr lang="es-ES" sz="1600" i="1" dirty="0" smtClean="0">
@@ -3622,7 +3593,7 @@
         <p:spPr>
           <a:xfrm>
             <a:off x="1587950" y="1696035"/>
-            <a:ext cx="1195097" cy="571709"/>
+            <a:ext cx="760930" cy="429871"/>
           </a:xfrm>
           <a:prstGeom prst="line">
             <a:avLst/>
@@ -3651,133 +3622,13 @@
       </p:cxnSp>
       <p:sp>
         <p:nvSpPr>
-          <p:cNvPr id="26" name="25 Rectángulo"/>
-          <p:cNvSpPr/>
-          <p:nvPr/>
-        </p:nvSpPr>
-        <p:spPr>
-          <a:xfrm>
-            <a:off x="378219" y="4355977"/>
-            <a:ext cx="1126655" cy="338554"/>
-          </a:xfrm>
-          <a:prstGeom prst="rect">
-            <a:avLst/>
-          </a:prstGeom>
-        </p:spPr>
-        <p:txBody>
-          <a:bodyPr wrap="none">
-            <a:spAutoFit/>
-          </a:bodyPr>
-          <a:lstStyle/>
-          <a:p>
-            <a:r>
-              <a:rPr lang="es-ES" sz="1600" i="1" dirty="0" err="1" smtClean="0">
-                <a:solidFill>
-                  <a:srgbClr val="FF0000"/>
-                </a:solidFill>
-              </a:rPr>
-              <a:t>gshortened</a:t>
-            </a:r>
-            <a:endParaRPr lang="es-ES" sz="1600" i="1" dirty="0">
-              <a:solidFill>
-                <a:srgbClr val="FF0000"/>
-              </a:solidFill>
-            </a:endParaRPr>
-          </a:p>
-        </p:txBody>
-      </p:sp>
-      <p:cxnSp>
-        <p:nvCxnSpPr>
-          <p:cNvPr id="24" name="23 Conector recto"/>
-          <p:cNvCxnSpPr/>
-          <p:nvPr/>
-        </p:nvCxnSpPr>
-        <p:spPr>
-          <a:xfrm flipV="1">
-            <a:off x="941546" y="3491880"/>
-            <a:ext cx="1243952" cy="864097"/>
-          </a:xfrm>
-          <a:prstGeom prst="line">
-            <a:avLst/>
-          </a:prstGeom>
-          <a:ln w="28575">
-            <a:solidFill>
-              <a:srgbClr val="FF0000"/>
-            </a:solidFill>
-            <a:prstDash val="sysDot"/>
-          </a:ln>
-        </p:spPr>
-        <p:style>
-          <a:lnRef idx="1">
-            <a:schemeClr val="accent1"/>
-          </a:lnRef>
-          <a:fillRef idx="0">
-            <a:schemeClr val="accent1"/>
-          </a:fillRef>
-          <a:effectRef idx="0">
-            <a:schemeClr val="accent1"/>
-          </a:effectRef>
-          <a:fontRef idx="minor">
-            <a:schemeClr val="tx1"/>
-          </a:fontRef>
-        </p:style>
-      </p:cxnSp>
-      <p:sp>
-        <p:nvSpPr>
-          <p:cNvPr id="25" name="24 Rectángulo"/>
-          <p:cNvSpPr/>
-          <p:nvPr/>
-        </p:nvSpPr>
-        <p:spPr>
-          <a:xfrm>
-            <a:off x="1988840" y="3131840"/>
-            <a:ext cx="391438" cy="360040"/>
-          </a:xfrm>
-          <a:prstGeom prst="rect">
-            <a:avLst/>
-          </a:prstGeom>
-          <a:noFill/>
-          <a:ln w="28575">
-            <a:solidFill>
-              <a:srgbClr val="FF0000"/>
-            </a:solidFill>
-            <a:prstDash val="sysDot"/>
-          </a:ln>
-        </p:spPr>
-        <p:style>
-          <a:lnRef idx="2">
-            <a:schemeClr val="accent1">
-              <a:shade val="50000"/>
-            </a:schemeClr>
-          </a:lnRef>
-          <a:fillRef idx="1">
-            <a:schemeClr val="accent1"/>
-          </a:fillRef>
-          <a:effectRef idx="0">
-            <a:schemeClr val="accent1"/>
-          </a:effectRef>
-          <a:fontRef idx="minor">
-            <a:schemeClr val="lt1"/>
-          </a:fontRef>
-        </p:style>
-        <p:txBody>
-          <a:bodyPr rtlCol="0" anchor="ctr"/>
-          <a:lstStyle/>
-          <a:p>
-            <a:pPr algn="ctr"/>
-            <a:endParaRPr lang="es-ES"/>
-          </a:p>
-        </p:txBody>
-      </p:sp>
-      <p:sp>
-        <p:nvSpPr>
           <p:cNvPr id="31" name="30 Rectángulo"/>
           <p:cNvSpPr/>
           <p:nvPr/>
         </p:nvSpPr>
         <p:spPr>
           <a:xfrm>
-            <a:off x="5387690" y="7347940"/>
+            <a:off x="5459698" y="7545814"/>
             <a:ext cx="957634" cy="338554"/>
           </a:xfrm>
           <a:prstGeom prst="rect">
@@ -3814,7 +3665,7 @@
         </p:nvCxnSpPr>
         <p:spPr>
           <a:xfrm flipV="1">
-            <a:off x="6309320" y="6907221"/>
+            <a:off x="6381328" y="7105095"/>
             <a:ext cx="72008" cy="617210"/>
           </a:xfrm>
           <a:prstGeom prst="line">
@@ -3850,7 +3701,7 @@
         </p:nvSpPr>
         <p:spPr>
           <a:xfrm>
-            <a:off x="4370018" y="6873824"/>
+            <a:off x="4185149" y="7504181"/>
             <a:ext cx="1388842" cy="338554"/>
           </a:xfrm>
           <a:prstGeom prst="rect">
@@ -3858,7 +3709,7 @@
           </a:prstGeom>
         </p:spPr>
         <p:txBody>
-          <a:bodyPr wrap="none">
+          <a:bodyPr wrap="square">
             <a:spAutoFit/>
           </a:bodyPr>
           <a:lstStyle/>
@@ -3887,8 +3738,8 @@
         </p:nvCxnSpPr>
         <p:spPr>
           <a:xfrm flipV="1">
-            <a:off x="4581128" y="6331054"/>
-            <a:ext cx="72008" cy="617210"/>
+            <a:off x="4396259" y="6714888"/>
+            <a:ext cx="483311" cy="863733"/>
           </a:xfrm>
           <a:prstGeom prst="line">
             <a:avLst/>
@@ -3923,7 +3774,7 @@
         </p:nvSpPr>
         <p:spPr>
           <a:xfrm>
-            <a:off x="5371343" y="1357481"/>
+            <a:off x="5718596" y="2018577"/>
             <a:ext cx="1196481" cy="338554"/>
           </a:xfrm>
           <a:prstGeom prst="rect">
@@ -3968,8 +3819,8 @@
         </p:nvCxnSpPr>
         <p:spPr>
           <a:xfrm flipH="1">
-            <a:off x="5387690" y="1696035"/>
-            <a:ext cx="581893" cy="246222"/>
+            <a:off x="5807809" y="2448957"/>
+            <a:ext cx="429503" cy="477040"/>
           </a:xfrm>
           <a:prstGeom prst="line">
             <a:avLst/>
@@ -4004,7 +3855,7 @@
         </p:nvSpPr>
         <p:spPr>
           <a:xfrm>
-            <a:off x="4309923" y="1095552"/>
+            <a:off x="4681630" y="1651273"/>
             <a:ext cx="1627690" cy="338554"/>
           </a:xfrm>
           <a:prstGeom prst="rect">
@@ -4041,8 +3892,8 @@
         </p:nvCxnSpPr>
         <p:spPr>
           <a:xfrm>
-            <a:off x="5064439" y="1434106"/>
-            <a:ext cx="59329" cy="261929"/>
+            <a:off x="5327652" y="1977617"/>
+            <a:ext cx="117572" cy="583161"/>
           </a:xfrm>
           <a:prstGeom prst="line">
             <a:avLst/>
@@ -4078,7 +3929,7 @@
         <p:spPr>
           <a:xfrm>
             <a:off x="160124" y="7956376"/>
-            <a:ext cx="6697876" cy="900246"/>
+            <a:ext cx="6697876" cy="1061829"/>
           </a:xfrm>
           <a:prstGeom prst="rect">
             <a:avLst/>
@@ -4092,243 +3943,270 @@
           <a:lstStyle/>
           <a:p>
             <a:r>
+              <a:rPr lang="es-ES" sz="1050" dirty="0" err="1">
+                <a:latin typeface="Lucida Sans Typewriter" panose="020B0509030504030204" pitchFamily="49" charset="0"/>
+              </a:rPr>
+              <a:t>polar_graph</a:t>
+            </a:r>
+            <a:r>
+              <a:rPr lang="es-ES" sz="1050" dirty="0">
+                <a:latin typeface="Lucida Sans Typewriter" panose="020B0509030504030204" pitchFamily="49" charset="0"/>
+              </a:rPr>
+              <a:t>("M_SD_001.csv","data/",</a:t>
+            </a:r>
+            <a:r>
+              <a:rPr lang="es-ES" sz="1050" dirty="0" err="1">
+                <a:latin typeface="Lucida Sans Typewriter" panose="020B0509030504030204" pitchFamily="49" charset="0"/>
+              </a:rPr>
+              <a:t>plotsdir</a:t>
+            </a:r>
+            <a:r>
+              <a:rPr lang="es-ES" sz="1050" dirty="0">
+                <a:latin typeface="Lucida Sans Typewriter" panose="020B0509030504030204" pitchFamily="49" charset="0"/>
+              </a:rPr>
+              <a:t>="</a:t>
+            </a:r>
+            <a:r>
+              <a:rPr lang="es-ES" sz="1050" dirty="0" err="1">
+                <a:latin typeface="Lucida Sans Typewriter" panose="020B0509030504030204" pitchFamily="49" charset="0"/>
+              </a:rPr>
+              <a:t>plot_results</a:t>
+            </a:r>
+            <a:r>
+              <a:rPr lang="es-ES" sz="1050" dirty="0">
+                <a:latin typeface="Lucida Sans Typewriter" panose="020B0509030504030204" pitchFamily="49" charset="0"/>
+              </a:rPr>
+              <a:t>/polar/",</a:t>
+            </a:r>
+          </a:p>
+          <a:p>
+            <a:r>
+              <a:rPr lang="es-ES" sz="1050" dirty="0" smtClean="0">
+                <a:latin typeface="Lucida Sans Typewriter" panose="020B0509030504030204" pitchFamily="49" charset="0"/>
+              </a:rPr>
+              <a:t>             </a:t>
+            </a:r>
+            <a:r>
+              <a:rPr lang="es-ES" sz="1050" dirty="0" err="1">
+                <a:latin typeface="Lucida Sans Typewriter" panose="020B0509030504030204" pitchFamily="49" charset="0"/>
+              </a:rPr>
+              <a:t>print_title</a:t>
+            </a:r>
+            <a:r>
+              <a:rPr lang="es-ES" sz="1050" dirty="0">
+                <a:latin typeface="Lucida Sans Typewriter" panose="020B0509030504030204" pitchFamily="49" charset="0"/>
+              </a:rPr>
+              <a:t> = TRUE, </a:t>
+            </a:r>
+            <a:r>
+              <a:rPr lang="es-ES" sz="1050" dirty="0" err="1">
+                <a:latin typeface="Lucida Sans Typewriter" panose="020B0509030504030204" pitchFamily="49" charset="0"/>
+              </a:rPr>
+              <a:t>print_to_file</a:t>
+            </a:r>
+            <a:r>
+              <a:rPr lang="es-ES" sz="1050" dirty="0">
+                <a:latin typeface="Lucida Sans Typewriter" panose="020B0509030504030204" pitchFamily="49" charset="0"/>
+              </a:rPr>
+              <a:t> = TRUE, </a:t>
+            </a:r>
+            <a:r>
+              <a:rPr lang="es-ES" sz="1050" dirty="0" err="1">
+                <a:latin typeface="Lucida Sans Typewriter" panose="020B0509030504030204" pitchFamily="49" charset="0"/>
+              </a:rPr>
+              <a:t>lsize_axis</a:t>
+            </a:r>
+            <a:r>
+              <a:rPr lang="es-ES" sz="1050" dirty="0">
+                <a:latin typeface="Lucida Sans Typewriter" panose="020B0509030504030204" pitchFamily="49" charset="0"/>
+              </a:rPr>
+              <a:t> = 16, </a:t>
+            </a:r>
+          </a:p>
+          <a:p>
+            <a:r>
+              <a:rPr lang="es-ES" sz="1050" dirty="0" smtClean="0">
+                <a:latin typeface="Lucida Sans Typewriter" panose="020B0509030504030204" pitchFamily="49" charset="0"/>
+              </a:rPr>
+              <a:t>             </a:t>
+            </a:r>
+            <a:r>
+              <a:rPr lang="es-ES" sz="1050" dirty="0" err="1">
+                <a:latin typeface="Lucida Sans Typewriter" panose="020B0509030504030204" pitchFamily="49" charset="0"/>
+              </a:rPr>
+              <a:t>lsize_legend</a:t>
+            </a:r>
+            <a:r>
+              <a:rPr lang="es-ES" sz="1050" dirty="0">
+                <a:latin typeface="Lucida Sans Typewriter" panose="020B0509030504030204" pitchFamily="49" charset="0"/>
+              </a:rPr>
+              <a:t> = 16,lsize_axis_title = 16, </a:t>
+            </a:r>
+            <a:r>
+              <a:rPr lang="es-ES" sz="1050" dirty="0" err="1">
+                <a:latin typeface="Lucida Sans Typewriter" panose="020B0509030504030204" pitchFamily="49" charset="0"/>
+              </a:rPr>
+              <a:t>lsize_legend_title</a:t>
+            </a:r>
+            <a:r>
+              <a:rPr lang="es-ES" sz="1050" dirty="0">
+                <a:latin typeface="Lucida Sans Typewriter" panose="020B0509030504030204" pitchFamily="49" charset="0"/>
+              </a:rPr>
+              <a:t> = 16, </a:t>
+            </a:r>
+          </a:p>
+          <a:p>
+            <a:r>
+              <a:rPr lang="es-ES" sz="1050" dirty="0" smtClean="0">
+                <a:latin typeface="Lucida Sans Typewriter" panose="020B0509030504030204" pitchFamily="49" charset="0"/>
+              </a:rPr>
+              <a:t>             </a:t>
+            </a:r>
+            <a:r>
+              <a:rPr lang="es-ES" sz="1050" dirty="0" err="1">
+                <a:latin typeface="Lucida Sans Typewriter" panose="020B0509030504030204" pitchFamily="49" charset="0"/>
+              </a:rPr>
+              <a:t>glabels</a:t>
+            </a:r>
+            <a:r>
+              <a:rPr lang="es-ES" sz="1050" dirty="0">
+                <a:latin typeface="Lucida Sans Typewriter" panose="020B0509030504030204" pitchFamily="49" charset="0"/>
+              </a:rPr>
+              <a:t> = c("</a:t>
+            </a:r>
+            <a:r>
+              <a:rPr lang="es-ES" sz="1050" dirty="0" err="1">
+                <a:latin typeface="Lucida Sans Typewriter" panose="020B0509030504030204" pitchFamily="49" charset="0"/>
+              </a:rPr>
+              <a:t>Plant</a:t>
+            </a:r>
+            <a:r>
+              <a:rPr lang="es-ES" sz="1050" dirty="0">
+                <a:latin typeface="Lucida Sans Typewriter" panose="020B0509030504030204" pitchFamily="49" charset="0"/>
+              </a:rPr>
+              <a:t>", "</a:t>
+            </a:r>
+            <a:r>
+              <a:rPr lang="es-ES" sz="1050" dirty="0" err="1">
+                <a:latin typeface="Lucida Sans Typewriter" panose="020B0509030504030204" pitchFamily="49" charset="0"/>
+              </a:rPr>
+              <a:t>Seed</a:t>
+            </a:r>
+            <a:r>
+              <a:rPr lang="es-ES" sz="1050" dirty="0">
+                <a:latin typeface="Lucida Sans Typewriter" panose="020B0509030504030204" pitchFamily="49" charset="0"/>
+              </a:rPr>
+              <a:t> </a:t>
+            </a:r>
+            <a:r>
+              <a:rPr lang="es-ES" sz="1050" dirty="0" err="1">
+                <a:latin typeface="Lucida Sans Typewriter" panose="020B0509030504030204" pitchFamily="49" charset="0"/>
+              </a:rPr>
+              <a:t>Disperser</a:t>
+            </a:r>
+            <a:r>
+              <a:rPr lang="es-ES" sz="1050" dirty="0">
+                <a:latin typeface="Lucida Sans Typewriter" panose="020B0509030504030204" pitchFamily="49" charset="0"/>
+              </a:rPr>
+              <a:t>"), </a:t>
+            </a:r>
+            <a:r>
+              <a:rPr lang="es-ES" sz="1050" dirty="0" err="1">
+                <a:latin typeface="Lucida Sans Typewriter" panose="020B0509030504030204" pitchFamily="49" charset="0"/>
+              </a:rPr>
+              <a:t>gshortened</a:t>
+            </a:r>
+            <a:r>
+              <a:rPr lang="es-ES" sz="1050" dirty="0">
+                <a:latin typeface="Lucida Sans Typewriter" panose="020B0509030504030204" pitchFamily="49" charset="0"/>
+              </a:rPr>
+              <a:t> = c("PL","SD"), </a:t>
+            </a:r>
+            <a:r>
+              <a:rPr lang="es-ES" sz="1050" dirty="0" smtClean="0">
+                <a:latin typeface="Lucida Sans Typewriter" panose="020B0509030504030204" pitchFamily="49" charset="0"/>
+              </a:rPr>
+              <a:t>	  </a:t>
+            </a:r>
+            <a:r>
               <a:rPr lang="es-ES" sz="1050" dirty="0" err="1" smtClean="0">
                 <a:latin typeface="Lucida Sans Typewriter" panose="020B0509030504030204" pitchFamily="49" charset="0"/>
               </a:rPr>
-              <a:t>polar_graph</a:t>
+              <a:t>fill_nodes</a:t>
             </a:r>
             <a:r>
               <a:rPr lang="es-ES" sz="1050" dirty="0" smtClean="0">
                 <a:latin typeface="Lucida Sans Typewriter" panose="020B0509030504030204" pitchFamily="49" charset="0"/>
               </a:rPr>
-              <a:t>("M_SD_001.csv","data/",</a:t>
+              <a:t> </a:t>
+            </a:r>
+            <a:r>
+              <a:rPr lang="es-ES" sz="1050" dirty="0">
+                <a:latin typeface="Lucida Sans Typewriter" panose="020B0509030504030204" pitchFamily="49" charset="0"/>
+              </a:rPr>
+              <a:t>= </a:t>
+            </a:r>
+            <a:r>
+              <a:rPr lang="es-ES" sz="1050" dirty="0" smtClean="0">
+                <a:latin typeface="Lucida Sans Typewriter" panose="020B0509030504030204" pitchFamily="49" charset="0"/>
+              </a:rPr>
+              <a:t>FALSE, </a:t>
             </a:r>
             <a:r>
               <a:rPr lang="es-ES" sz="1050" dirty="0" err="1" smtClean="0">
                 <a:latin typeface="Lucida Sans Typewriter" panose="020B0509030504030204" pitchFamily="49" charset="0"/>
               </a:rPr>
-              <a:t>plotsdir</a:t>
+              <a:t>printable_labels</a:t>
             </a:r>
             <a:r>
               <a:rPr lang="es-ES" sz="1050" dirty="0" smtClean="0">
                 <a:latin typeface="Lucida Sans Typewriter" panose="020B0509030504030204" pitchFamily="49" charset="0"/>
               </a:rPr>
-              <a:t>="</a:t>
-            </a:r>
-            <a:r>
-              <a:rPr lang="es-ES" sz="1050" dirty="0" err="1" smtClean="0">
+              <a:t> </a:t>
+            </a:r>
+            <a:r>
+              <a:rPr lang="es-ES" sz="1050" dirty="0">
                 <a:latin typeface="Lucida Sans Typewriter" panose="020B0509030504030204" pitchFamily="49" charset="0"/>
               </a:rPr>
-              <a:t>grafresults</a:t>
+              <a:t>= 100, </a:t>
+            </a:r>
+            <a:endParaRPr lang="es-ES" sz="1050" dirty="0" smtClean="0">
+              <a:latin typeface="Lucida Sans Typewriter" panose="020B0509030504030204" pitchFamily="49" charset="0"/>
+            </a:endParaRPr>
+          </a:p>
+          <a:p>
+            <a:r>
+              <a:rPr lang="es-ES" sz="1050">
+                <a:latin typeface="Lucida Sans Typewriter" panose="020B0509030504030204" pitchFamily="49" charset="0"/>
+              </a:rPr>
+              <a:t> </a:t>
+            </a:r>
+            <a:r>
+              <a:rPr lang="es-ES" sz="1050" smtClean="0">
+                <a:latin typeface="Lucida Sans Typewriter" panose="020B0509030504030204" pitchFamily="49" charset="0"/>
+              </a:rPr>
+              <a:t>            file_name_append</a:t>
             </a:r>
             <a:r>
               <a:rPr lang="es-ES" sz="1050" dirty="0" smtClean="0">
                 <a:latin typeface="Lucida Sans Typewriter" panose="020B0509030504030204" pitchFamily="49" charset="0"/>
               </a:rPr>
-              <a:t>/",</a:t>
-            </a:r>
-          </a:p>
-          <a:p>
-            <a:r>
-              <a:rPr lang="es-ES" sz="1050" dirty="0" smtClean="0">
+              <a:t> </a:t>
+            </a:r>
+            <a:r>
+              <a:rPr lang="es-ES" sz="1050" dirty="0">
                 <a:latin typeface="Lucida Sans Typewriter" panose="020B0509030504030204" pitchFamily="49" charset="0"/>
               </a:rPr>
-              <a:t>             </a:t>
-            </a:r>
-            <a:r>
-              <a:rPr lang="es-ES" sz="1050" dirty="0" err="1" smtClean="0">
+              <a:t>= "</a:t>
+            </a:r>
+            <a:r>
+              <a:rPr lang="es-ES" sz="1050" dirty="0" err="1">
                 <a:latin typeface="Lucida Sans Typewriter" panose="020B0509030504030204" pitchFamily="49" charset="0"/>
               </a:rPr>
-              <a:t>print_title</a:t>
-            </a:r>
-            <a:r>
-              <a:rPr lang="es-ES" sz="1050" dirty="0" smtClean="0">
-                <a:latin typeface="Lucida Sans Typewriter" panose="020B0509030504030204" pitchFamily="49" charset="0"/>
-              </a:rPr>
-              <a:t> </a:t>
-            </a:r>
-            <a:r>
-              <a:rPr lang="es-ES" sz="1050" dirty="0" smtClean="0">
-                <a:latin typeface="Lucida Sans Typewriter" panose="020B0509030504030204" pitchFamily="49" charset="0"/>
-              </a:rPr>
-              <a:t>= TRUE, </a:t>
-            </a:r>
-            <a:r>
-              <a:rPr lang="es-ES" sz="1050" dirty="0" err="1" smtClean="0">
-                <a:latin typeface="Lucida Sans Typewriter" panose="020B0509030504030204" pitchFamily="49" charset="0"/>
-              </a:rPr>
-              <a:t>print_to_file</a:t>
-            </a:r>
-            <a:r>
-              <a:rPr lang="es-ES" sz="1050" dirty="0" smtClean="0">
-                <a:latin typeface="Lucida Sans Typewriter" panose="020B0509030504030204" pitchFamily="49" charset="0"/>
-              </a:rPr>
-              <a:t> = TRUE, </a:t>
-            </a:r>
-            <a:r>
-              <a:rPr lang="es-ES" sz="1050" dirty="0" err="1" smtClean="0">
-                <a:latin typeface="Lucida Sans Typewriter" panose="020B0509030504030204" pitchFamily="49" charset="0"/>
-              </a:rPr>
-              <a:t>lsize_axis</a:t>
-            </a:r>
-            <a:r>
-              <a:rPr lang="es-ES" sz="1050" dirty="0" smtClean="0">
-                <a:latin typeface="Lucida Sans Typewriter" panose="020B0509030504030204" pitchFamily="49" charset="0"/>
-              </a:rPr>
-              <a:t> = 16, </a:t>
-            </a:r>
-          </a:p>
-          <a:p>
-            <a:r>
-              <a:rPr lang="es-ES" sz="1050" dirty="0" smtClean="0">
-                <a:latin typeface="Lucida Sans Typewriter" panose="020B0509030504030204" pitchFamily="49" charset="0"/>
-              </a:rPr>
-              <a:t>             </a:t>
-            </a:r>
-            <a:r>
-              <a:rPr lang="es-ES" sz="1050" dirty="0" err="1" smtClean="0">
-                <a:latin typeface="Lucida Sans Typewriter" panose="020B0509030504030204" pitchFamily="49" charset="0"/>
-              </a:rPr>
-              <a:t>lsize_legend</a:t>
-            </a:r>
-            <a:r>
-              <a:rPr lang="es-ES" sz="1050" dirty="0" smtClean="0">
-                <a:latin typeface="Lucida Sans Typewriter" panose="020B0509030504030204" pitchFamily="49" charset="0"/>
-              </a:rPr>
-              <a:t> </a:t>
-            </a:r>
-            <a:r>
-              <a:rPr lang="es-ES" sz="1050" dirty="0" smtClean="0">
-                <a:latin typeface="Lucida Sans Typewriter" panose="020B0509030504030204" pitchFamily="49" charset="0"/>
-              </a:rPr>
-              <a:t>= 16,lsize_axis_title = 16, </a:t>
-            </a:r>
-            <a:r>
-              <a:rPr lang="es-ES" sz="1050" dirty="0" err="1" smtClean="0">
-                <a:latin typeface="Lucida Sans Typewriter" panose="020B0509030504030204" pitchFamily="49" charset="0"/>
-              </a:rPr>
-              <a:t>lsize_legend_title</a:t>
-            </a:r>
-            <a:r>
-              <a:rPr lang="es-ES" sz="1050" dirty="0" smtClean="0">
-                <a:latin typeface="Lucida Sans Typewriter" panose="020B0509030504030204" pitchFamily="49" charset="0"/>
-              </a:rPr>
-              <a:t> = 16, </a:t>
-            </a:r>
-          </a:p>
-          <a:p>
-            <a:r>
-              <a:rPr lang="es-ES" sz="1050" dirty="0" smtClean="0">
-                <a:latin typeface="Lucida Sans Typewriter" panose="020B0509030504030204" pitchFamily="49" charset="0"/>
-              </a:rPr>
-              <a:t>             </a:t>
-            </a:r>
-            <a:r>
-              <a:rPr lang="es-ES" sz="1050" dirty="0" err="1" smtClean="0">
-                <a:latin typeface="Lucida Sans Typewriter" panose="020B0509030504030204" pitchFamily="49" charset="0"/>
-              </a:rPr>
-              <a:t>glabels</a:t>
-            </a:r>
-            <a:r>
-              <a:rPr lang="es-ES" sz="1050" dirty="0" smtClean="0">
-                <a:latin typeface="Lucida Sans Typewriter" panose="020B0509030504030204" pitchFamily="49" charset="0"/>
-              </a:rPr>
-              <a:t> </a:t>
-            </a:r>
-            <a:r>
-              <a:rPr lang="es-ES" sz="1050" dirty="0" smtClean="0">
-                <a:latin typeface="Lucida Sans Typewriter" panose="020B0509030504030204" pitchFamily="49" charset="0"/>
-              </a:rPr>
-              <a:t>= c("</a:t>
-            </a:r>
-            <a:r>
-              <a:rPr lang="es-ES" sz="1050" dirty="0" err="1" smtClean="0">
-                <a:latin typeface="Lucida Sans Typewriter" panose="020B0509030504030204" pitchFamily="49" charset="0"/>
-              </a:rPr>
-              <a:t>Plant</a:t>
-            </a:r>
-            <a:r>
-              <a:rPr lang="es-ES" sz="1050" dirty="0" smtClean="0">
-                <a:latin typeface="Lucida Sans Typewriter" panose="020B0509030504030204" pitchFamily="49" charset="0"/>
-              </a:rPr>
-              <a:t>", "</a:t>
-            </a:r>
-            <a:r>
-              <a:rPr lang="es-ES" sz="1050" dirty="0" err="1" smtClean="0">
-                <a:latin typeface="Lucida Sans Typewriter" panose="020B0509030504030204" pitchFamily="49" charset="0"/>
-              </a:rPr>
-              <a:t>Seed</a:t>
-            </a:r>
-            <a:r>
-              <a:rPr lang="es-ES" sz="1050" dirty="0" smtClean="0">
-                <a:latin typeface="Lucida Sans Typewriter" panose="020B0509030504030204" pitchFamily="49" charset="0"/>
-              </a:rPr>
-              <a:t> </a:t>
-            </a:r>
-            <a:r>
-              <a:rPr lang="es-ES" sz="1050" dirty="0" err="1" smtClean="0">
-                <a:latin typeface="Lucida Sans Typewriter" panose="020B0509030504030204" pitchFamily="49" charset="0"/>
-              </a:rPr>
-              <a:t>Disperser</a:t>
-            </a:r>
-            <a:r>
-              <a:rPr lang="es-ES" sz="1050" dirty="0" smtClean="0">
-                <a:latin typeface="Lucida Sans Typewriter" panose="020B0509030504030204" pitchFamily="49" charset="0"/>
-              </a:rPr>
-              <a:t>"), </a:t>
-            </a:r>
-            <a:r>
-              <a:rPr lang="es-ES" sz="1050" dirty="0" err="1" smtClean="0">
-                <a:latin typeface="Lucida Sans Typewriter" panose="020B0509030504030204" pitchFamily="49" charset="0"/>
-              </a:rPr>
-              <a:t>gshortened</a:t>
-            </a:r>
-            <a:r>
-              <a:rPr lang="es-ES" sz="1050" dirty="0" smtClean="0">
-                <a:latin typeface="Lucida Sans Typewriter" panose="020B0509030504030204" pitchFamily="49" charset="0"/>
-              </a:rPr>
-              <a:t> = c("PL","SD"), </a:t>
-            </a:r>
-          </a:p>
-          <a:p>
-            <a:r>
-              <a:rPr lang="es-ES" sz="1050" smtClean="0">
-                <a:latin typeface="Lucida Sans Typewriter" panose="020B0509030504030204" pitchFamily="49" charset="0"/>
-              </a:rPr>
-              <a:t>             printable_labels</a:t>
-            </a:r>
-            <a:r>
-              <a:rPr lang="es-ES" sz="1050" dirty="0" smtClean="0">
-                <a:latin typeface="Lucida Sans Typewriter" panose="020B0509030504030204" pitchFamily="49" charset="0"/>
-              </a:rPr>
-              <a:t> </a:t>
-            </a:r>
-            <a:r>
-              <a:rPr lang="es-ES" sz="1050" dirty="0" smtClean="0">
-                <a:latin typeface="Lucida Sans Typewriter" panose="020B0509030504030204" pitchFamily="49" charset="0"/>
-              </a:rPr>
-              <a:t>= 3, </a:t>
-            </a:r>
-            <a:r>
-              <a:rPr lang="es-ES" sz="1050" dirty="0" err="1" smtClean="0">
-                <a:latin typeface="Lucida Sans Typewriter" panose="020B0509030504030204" pitchFamily="49" charset="0"/>
-              </a:rPr>
-              <a:t>file_name_append</a:t>
-            </a:r>
-            <a:r>
-              <a:rPr lang="es-ES" sz="1050" dirty="0" smtClean="0">
-                <a:latin typeface="Lucida Sans Typewriter" panose="020B0509030504030204" pitchFamily="49" charset="0"/>
-              </a:rPr>
-              <a:t> = "</a:t>
-            </a:r>
-            <a:r>
-              <a:rPr lang="es-ES" sz="1050" dirty="0" err="1" smtClean="0">
-                <a:latin typeface="Lucida Sans Typewriter" panose="020B0509030504030204" pitchFamily="49" charset="0"/>
-              </a:rPr>
               <a:t>showpars</a:t>
             </a:r>
             <a:r>
-              <a:rPr lang="es-ES" sz="1050" dirty="0" smtClean="0">
+              <a:rPr lang="es-ES" sz="1050" dirty="0">
                 <a:latin typeface="Lucida Sans Typewriter" panose="020B0509030504030204" pitchFamily="49" charset="0"/>
               </a:rPr>
               <a:t>")</a:t>
@@ -4339,6 +4217,87 @@
           </a:p>
         </p:txBody>
       </p:sp>
+      <p:sp>
+        <p:nvSpPr>
+          <p:cNvPr id="39" name="40 Rectángulo"/>
+          <p:cNvSpPr/>
+          <p:nvPr/>
+        </p:nvSpPr>
+        <p:spPr>
+          <a:xfrm>
+            <a:off x="64554" y="3162617"/>
+            <a:ext cx="1663019" cy="338554"/>
+          </a:xfrm>
+          <a:prstGeom prst="rect">
+            <a:avLst/>
+          </a:prstGeom>
+        </p:spPr>
+        <p:txBody>
+          <a:bodyPr wrap="none">
+            <a:spAutoFit/>
+          </a:bodyPr>
+          <a:lstStyle/>
+          <a:p>
+            <a:r>
+              <a:rPr lang="es-ES" sz="1600" i="1" dirty="0" err="1" smtClean="0">
+                <a:solidFill>
+                  <a:srgbClr val="FF0000"/>
+                </a:solidFill>
+              </a:rPr>
+              <a:t>fill_nodes</a:t>
+            </a:r>
+            <a:r>
+              <a:rPr lang="es-ES" sz="1600" i="1" dirty="0" smtClean="0">
+                <a:solidFill>
+                  <a:srgbClr val="FF0000"/>
+                </a:solidFill>
+              </a:rPr>
+              <a:t> = FALSE</a:t>
+            </a:r>
+            <a:endParaRPr lang="es-ES" sz="1600" i="1" dirty="0">
+              <a:solidFill>
+                <a:srgbClr val="FF0000"/>
+              </a:solidFill>
+            </a:endParaRPr>
+          </a:p>
+        </p:txBody>
+      </p:sp>
+      <p:cxnSp>
+        <p:nvCxnSpPr>
+          <p:cNvPr id="40" name="20 Conector recto"/>
+          <p:cNvCxnSpPr/>
+          <p:nvPr/>
+        </p:nvCxnSpPr>
+        <p:spPr>
+          <a:xfrm flipV="1">
+            <a:off x="1712326" y="2935621"/>
+            <a:ext cx="780570" cy="396273"/>
+          </a:xfrm>
+          <a:prstGeom prst="line">
+            <a:avLst/>
+          </a:prstGeom>
+          <a:ln w="28575">
+            <a:solidFill>
+              <a:srgbClr val="FF0000"/>
+            </a:solidFill>
+            <a:prstDash val="sysDot"/>
+          </a:ln>
+        </p:spPr>
+        <p:style>
+          <a:lnRef idx="1">
+            <a:schemeClr val="accent1"/>
+          </a:lnRef>
+          <a:fillRef idx="0">
+            <a:schemeClr val="accent1"/>
+          </a:fillRef>
+          <a:effectRef idx="0">
+            <a:schemeClr val="accent1"/>
+          </a:effectRef>
+          <a:fontRef idx="minor">
+            <a:schemeClr val="tx1"/>
+          </a:fontRef>
+        </p:style>
+      </p:cxnSp>
     </p:spTree>
     <p:extLst>
       <p:ext uri="{BB962C8B-B14F-4D97-AF65-F5344CB8AC3E}">

</xml_diff>